<commit_message>
Fix music end game, fix portals end game
</commit_message>
<xml_diff>
--- a/Portak.pptx
+++ b/Portak.pptx
@@ -6,14 +6,15 @@
   </p:sldMasterIdLst>
   <p:sldIdLst>
     <p:sldId id="256" r:id="rId2"/>
-    <p:sldId id="258" r:id="rId3"/>
-    <p:sldId id="259" r:id="rId4"/>
-    <p:sldId id="260" r:id="rId5"/>
-    <p:sldId id="264" r:id="rId6"/>
-    <p:sldId id="261" r:id="rId7"/>
-    <p:sldId id="262" r:id="rId8"/>
-    <p:sldId id="263" r:id="rId9"/>
-    <p:sldId id="257" r:id="rId10"/>
+    <p:sldId id="265" r:id="rId3"/>
+    <p:sldId id="258" r:id="rId4"/>
+    <p:sldId id="259" r:id="rId5"/>
+    <p:sldId id="260" r:id="rId6"/>
+    <p:sldId id="264" r:id="rId7"/>
+    <p:sldId id="261" r:id="rId8"/>
+    <p:sldId id="262" r:id="rId9"/>
+    <p:sldId id="263" r:id="rId10"/>
+    <p:sldId id="257" r:id="rId11"/>
   </p:sldIdLst>
   <p:sldSz cx="12192000" cy="6858000"/>
   <p:notesSz cx="6858000" cy="9144000"/>
@@ -120,6 +121,10 @@
 </p:presentation>
 </file>
 
+<file path=ppt/revisionInfo.xml><?xml version="1.0" encoding="utf-8"?>
+<p1510:revInfo xmlns:a="http://schemas.openxmlformats.org/drawingml/2006/main" xmlns:r="http://schemas.openxmlformats.org/officeDocument/2006/relationships" xmlns:p1510="http://schemas.microsoft.com/office/powerpoint/2015/10/main"/>
+</file>
+
 <file path=ppt/slideLayouts/slideLayout1.xml><?xml version="1.0" encoding="utf-8"?>
 <p:sldLayout xmlns:a="http://schemas.openxmlformats.org/drawingml/2006/main" xmlns:r="http://schemas.openxmlformats.org/officeDocument/2006/relationships" xmlns:p="http://schemas.openxmlformats.org/presentationml/2006/main" type="title" preserve="1">
   <p:cSld name="Diapositive de titre">
@@ -162,10 +167,9 @@
           </a:lstStyle>
           <a:p>
             <a:r>
-              <a:rPr lang="fr-FR" smtClean="0"/>
+              <a:rPr lang="fr-FR"/>
               <a:t>Cliquez et modifiez le titre</a:t>
             </a:r>
-            <a:endParaRPr lang="fr-FR"/>
           </a:p>
         </p:txBody>
       </p:sp>
@@ -227,10 +231,9 @@
           </a:lstStyle>
           <a:p>
             <a:r>
-              <a:rPr lang="fr-FR" smtClean="0"/>
+              <a:rPr lang="fr-FR"/>
               <a:t>Cliquez pour modifier le style des sous-titres du masque</a:t>
             </a:r>
-            <a:endParaRPr lang="fr-FR"/>
           </a:p>
         </p:txBody>
       </p:sp>
@@ -251,7 +254,7 @@
           <a:p>
             <a:fld id="{4AAD347D-5ACD-4C99-B74B-A9C85AD731AF}" type="datetimeFigureOut">
               <a:rPr lang="en-US" smtClean="0"/>
-              <a:t>5/12/18</a:t>
+              <a:t>5/13/2018</a:t>
             </a:fld>
             <a:endParaRPr lang="en-US" dirty="0"/>
           </a:p>
@@ -293,7 +296,7 @@
           <a:p>
             <a:fld id="{D57F1E4F-1CFF-5643-939E-02111984F565}" type="slidenum">
               <a:rPr lang="en-US" smtClean="0"/>
-              <a:t>‹#›</a:t>
+              <a:t>‹N°›</a:t>
             </a:fld>
             <a:endParaRPr lang="en-US" dirty="0"/>
           </a:p>
@@ -350,10 +353,9 @@
           <a:lstStyle/>
           <a:p>
             <a:r>
-              <a:rPr lang="fr-FR" smtClean="0"/>
+              <a:rPr lang="fr-FR"/>
               <a:t>Cliquez et modifiez le titre</a:t>
             </a:r>
-            <a:endParaRPr lang="fr-FR"/>
           </a:p>
         </p:txBody>
       </p:sp>
@@ -374,38 +376,37 @@
           <a:p>
             <a:pPr lvl="0"/>
             <a:r>
-              <a:rPr lang="fr-FR" smtClean="0"/>
+              <a:rPr lang="fr-FR"/>
               <a:t>Cliquez pour modifier les styles du texte du masque</a:t>
             </a:r>
           </a:p>
           <a:p>
             <a:pPr lvl="1"/>
             <a:r>
-              <a:rPr lang="fr-FR" smtClean="0"/>
+              <a:rPr lang="fr-FR"/>
               <a:t>Deuxième niveau</a:t>
             </a:r>
           </a:p>
           <a:p>
             <a:pPr lvl="2"/>
             <a:r>
-              <a:rPr lang="fr-FR" smtClean="0"/>
+              <a:rPr lang="fr-FR"/>
               <a:t>Troisième niveau</a:t>
             </a:r>
           </a:p>
           <a:p>
             <a:pPr lvl="3"/>
             <a:r>
-              <a:rPr lang="fr-FR" smtClean="0"/>
+              <a:rPr lang="fr-FR"/>
               <a:t>Quatrième niveau</a:t>
             </a:r>
           </a:p>
           <a:p>
             <a:pPr lvl="4"/>
             <a:r>
-              <a:rPr lang="fr-FR" smtClean="0"/>
+              <a:rPr lang="fr-FR"/>
               <a:t>Cinquième niveau</a:t>
             </a:r>
-            <a:endParaRPr lang="fr-FR"/>
           </a:p>
         </p:txBody>
       </p:sp>
@@ -426,7 +427,7 @@
           <a:p>
             <a:fld id="{4509A250-FF31-4206-8172-F9D3106AACB1}" type="datetimeFigureOut">
               <a:rPr lang="en-US" smtClean="0"/>
-              <a:t>5/12/18</a:t>
+              <a:t>5/13/2018</a:t>
             </a:fld>
             <a:endParaRPr lang="en-US" dirty="0"/>
           </a:p>
@@ -468,7 +469,7 @@
           <a:p>
             <a:fld id="{D57F1E4F-1CFF-5643-939E-02111984F565}" type="slidenum">
               <a:rPr lang="en-US" smtClean="0"/>
-              <a:t>‹#›</a:t>
+              <a:t>‹N°›</a:t>
             </a:fld>
             <a:endParaRPr lang="en-US" dirty="0"/>
           </a:p>
@@ -525,10 +526,9 @@
           <a:lstStyle/>
           <a:p>
             <a:r>
-              <a:rPr lang="fr-FR" smtClean="0"/>
+              <a:rPr lang="fr-FR"/>
               <a:t>Cliquez et modifiez le titre</a:t>
             </a:r>
-            <a:endParaRPr lang="fr-FR"/>
           </a:p>
         </p:txBody>
       </p:sp>
@@ -554,38 +554,37 @@
           <a:p>
             <a:pPr lvl="0"/>
             <a:r>
-              <a:rPr lang="fr-FR" smtClean="0"/>
+              <a:rPr lang="fr-FR"/>
               <a:t>Cliquez pour modifier les styles du texte du masque</a:t>
             </a:r>
           </a:p>
           <a:p>
             <a:pPr lvl="1"/>
             <a:r>
-              <a:rPr lang="fr-FR" smtClean="0"/>
+              <a:rPr lang="fr-FR"/>
               <a:t>Deuxième niveau</a:t>
             </a:r>
           </a:p>
           <a:p>
             <a:pPr lvl="2"/>
             <a:r>
-              <a:rPr lang="fr-FR" smtClean="0"/>
+              <a:rPr lang="fr-FR"/>
               <a:t>Troisième niveau</a:t>
             </a:r>
           </a:p>
           <a:p>
             <a:pPr lvl="3"/>
             <a:r>
-              <a:rPr lang="fr-FR" smtClean="0"/>
+              <a:rPr lang="fr-FR"/>
               <a:t>Quatrième niveau</a:t>
             </a:r>
           </a:p>
           <a:p>
             <a:pPr lvl="4"/>
             <a:r>
-              <a:rPr lang="fr-FR" smtClean="0"/>
+              <a:rPr lang="fr-FR"/>
               <a:t>Cinquième niveau</a:t>
             </a:r>
-            <a:endParaRPr lang="fr-FR"/>
           </a:p>
         </p:txBody>
       </p:sp>
@@ -606,7 +605,7 @@
           <a:p>
             <a:fld id="{4509A250-FF31-4206-8172-F9D3106AACB1}" type="datetimeFigureOut">
               <a:rPr lang="en-US" smtClean="0"/>
-              <a:t>5/12/18</a:t>
+              <a:t>5/13/2018</a:t>
             </a:fld>
             <a:endParaRPr lang="en-US" dirty="0"/>
           </a:p>
@@ -648,7 +647,7 @@
           <a:p>
             <a:fld id="{D57F1E4F-1CFF-5643-939E-02111984F565}" type="slidenum">
               <a:rPr lang="en-US" smtClean="0"/>
-              <a:t>‹#›</a:t>
+              <a:t>‹N°›</a:t>
             </a:fld>
             <a:endParaRPr lang="en-US" dirty="0"/>
           </a:p>
@@ -705,10 +704,9 @@
           <a:lstStyle/>
           <a:p>
             <a:r>
-              <a:rPr lang="fr-FR" smtClean="0"/>
+              <a:rPr lang="fr-FR"/>
               <a:t>Cliquez et modifiez le titre</a:t>
             </a:r>
-            <a:endParaRPr lang="fr-FR"/>
           </a:p>
         </p:txBody>
       </p:sp>
@@ -729,38 +727,37 @@
           <a:p>
             <a:pPr lvl="0"/>
             <a:r>
-              <a:rPr lang="fr-FR" smtClean="0"/>
+              <a:rPr lang="fr-FR"/>
               <a:t>Cliquez pour modifier les styles du texte du masque</a:t>
             </a:r>
           </a:p>
           <a:p>
             <a:pPr lvl="1"/>
             <a:r>
-              <a:rPr lang="fr-FR" smtClean="0"/>
+              <a:rPr lang="fr-FR"/>
               <a:t>Deuxième niveau</a:t>
             </a:r>
           </a:p>
           <a:p>
             <a:pPr lvl="2"/>
             <a:r>
-              <a:rPr lang="fr-FR" smtClean="0"/>
+              <a:rPr lang="fr-FR"/>
               <a:t>Troisième niveau</a:t>
             </a:r>
           </a:p>
           <a:p>
             <a:pPr lvl="3"/>
             <a:r>
-              <a:rPr lang="fr-FR" smtClean="0"/>
+              <a:rPr lang="fr-FR"/>
               <a:t>Quatrième niveau</a:t>
             </a:r>
           </a:p>
           <a:p>
             <a:pPr lvl="4"/>
             <a:r>
-              <a:rPr lang="fr-FR" smtClean="0"/>
+              <a:rPr lang="fr-FR"/>
               <a:t>Cinquième niveau</a:t>
             </a:r>
-            <a:endParaRPr lang="fr-FR"/>
           </a:p>
         </p:txBody>
       </p:sp>
@@ -781,7 +778,7 @@
           <a:p>
             <a:fld id="{4509A250-FF31-4206-8172-F9D3106AACB1}" type="datetimeFigureOut">
               <a:rPr lang="en-US" smtClean="0"/>
-              <a:t>5/12/18</a:t>
+              <a:t>5/13/2018</a:t>
             </a:fld>
             <a:endParaRPr lang="en-US" dirty="0"/>
           </a:p>
@@ -823,7 +820,7 @@
           <a:p>
             <a:fld id="{D57F1E4F-1CFF-5643-939E-02111984F565}" type="slidenum">
               <a:rPr lang="en-US" smtClean="0"/>
-              <a:t>‹#›</a:t>
+              <a:t>‹N°›</a:t>
             </a:fld>
             <a:endParaRPr lang="en-US" dirty="0"/>
           </a:p>
@@ -884,10 +881,9 @@
           </a:lstStyle>
           <a:p>
             <a:r>
-              <a:rPr lang="fr-FR" smtClean="0"/>
+              <a:rPr lang="fr-FR"/>
               <a:t>Cliquez et modifiez le titre</a:t>
             </a:r>
-            <a:endParaRPr lang="fr-FR"/>
           </a:p>
         </p:txBody>
       </p:sp>
@@ -1004,7 +1000,7 @@
           <a:p>
             <a:pPr lvl="0"/>
             <a:r>
-              <a:rPr lang="fr-FR" smtClean="0"/>
+              <a:rPr lang="fr-FR"/>
               <a:t>Cliquez pour modifier les styles du texte du masque</a:t>
             </a:r>
           </a:p>
@@ -1027,7 +1023,7 @@
           <a:p>
             <a:fld id="{9796027F-7875-4030-9381-8BD8C4F21935}" type="datetimeFigureOut">
               <a:rPr lang="en-US" smtClean="0"/>
-              <a:t>5/12/18</a:t>
+              <a:t>5/13/2018</a:t>
             </a:fld>
             <a:endParaRPr lang="en-US" dirty="0"/>
           </a:p>
@@ -1069,7 +1065,7 @@
           <a:p>
             <a:fld id="{D57F1E4F-1CFF-5643-939E-02111984F565}" type="slidenum">
               <a:rPr lang="en-US" smtClean="0"/>
-              <a:t>‹#›</a:t>
+              <a:t>‹N°›</a:t>
             </a:fld>
             <a:endParaRPr lang="en-US" dirty="0"/>
           </a:p>
@@ -1126,10 +1122,9 @@
           <a:lstStyle/>
           <a:p>
             <a:r>
-              <a:rPr lang="fr-FR" smtClean="0"/>
+              <a:rPr lang="fr-FR"/>
               <a:t>Cliquez et modifiez le titre</a:t>
             </a:r>
-            <a:endParaRPr lang="fr-FR"/>
           </a:p>
         </p:txBody>
       </p:sp>
@@ -1155,38 +1150,37 @@
           <a:p>
             <a:pPr lvl="0"/>
             <a:r>
-              <a:rPr lang="fr-FR" smtClean="0"/>
+              <a:rPr lang="fr-FR"/>
               <a:t>Cliquez pour modifier les styles du texte du masque</a:t>
             </a:r>
           </a:p>
           <a:p>
             <a:pPr lvl="1"/>
             <a:r>
-              <a:rPr lang="fr-FR" smtClean="0"/>
+              <a:rPr lang="fr-FR"/>
               <a:t>Deuxième niveau</a:t>
             </a:r>
           </a:p>
           <a:p>
             <a:pPr lvl="2"/>
             <a:r>
-              <a:rPr lang="fr-FR" smtClean="0"/>
+              <a:rPr lang="fr-FR"/>
               <a:t>Troisième niveau</a:t>
             </a:r>
           </a:p>
           <a:p>
             <a:pPr lvl="3"/>
             <a:r>
-              <a:rPr lang="fr-FR" smtClean="0"/>
+              <a:rPr lang="fr-FR"/>
               <a:t>Quatrième niveau</a:t>
             </a:r>
           </a:p>
           <a:p>
             <a:pPr lvl="4"/>
             <a:r>
-              <a:rPr lang="fr-FR" smtClean="0"/>
+              <a:rPr lang="fr-FR"/>
               <a:t>Cinquième niveau</a:t>
             </a:r>
-            <a:endParaRPr lang="fr-FR"/>
           </a:p>
         </p:txBody>
       </p:sp>
@@ -1212,38 +1206,37 @@
           <a:p>
             <a:pPr lvl="0"/>
             <a:r>
-              <a:rPr lang="fr-FR" smtClean="0"/>
+              <a:rPr lang="fr-FR"/>
               <a:t>Cliquez pour modifier les styles du texte du masque</a:t>
             </a:r>
           </a:p>
           <a:p>
             <a:pPr lvl="1"/>
             <a:r>
-              <a:rPr lang="fr-FR" smtClean="0"/>
+              <a:rPr lang="fr-FR"/>
               <a:t>Deuxième niveau</a:t>
             </a:r>
           </a:p>
           <a:p>
             <a:pPr lvl="2"/>
             <a:r>
-              <a:rPr lang="fr-FR" smtClean="0"/>
+              <a:rPr lang="fr-FR"/>
               <a:t>Troisième niveau</a:t>
             </a:r>
           </a:p>
           <a:p>
             <a:pPr lvl="3"/>
             <a:r>
-              <a:rPr lang="fr-FR" smtClean="0"/>
+              <a:rPr lang="fr-FR"/>
               <a:t>Quatrième niveau</a:t>
             </a:r>
           </a:p>
           <a:p>
             <a:pPr lvl="4"/>
             <a:r>
-              <a:rPr lang="fr-FR" smtClean="0"/>
+              <a:rPr lang="fr-FR"/>
               <a:t>Cinquième niveau</a:t>
             </a:r>
-            <a:endParaRPr lang="fr-FR"/>
           </a:p>
         </p:txBody>
       </p:sp>
@@ -1264,7 +1257,7 @@
           <a:p>
             <a:fld id="{9796027F-7875-4030-9381-8BD8C4F21935}" type="datetimeFigureOut">
               <a:rPr lang="en-US" smtClean="0"/>
-              <a:t>5/12/18</a:t>
+              <a:t>5/13/2018</a:t>
             </a:fld>
             <a:endParaRPr lang="en-US" dirty="0"/>
           </a:p>
@@ -1306,7 +1299,7 @@
           <a:p>
             <a:fld id="{D57F1E4F-1CFF-5643-939E-02111984F565}" type="slidenum">
               <a:rPr lang="en-US" smtClean="0"/>
-              <a:t>‹#›</a:t>
+              <a:t>‹N°›</a:t>
             </a:fld>
             <a:endParaRPr lang="en-US" dirty="0"/>
           </a:p>
@@ -1363,10 +1356,9 @@
           <a:lstStyle/>
           <a:p>
             <a:r>
-              <a:rPr lang="fr-FR" smtClean="0"/>
+              <a:rPr lang="fr-FR"/>
               <a:t>Cliquez et modifiez le titre</a:t>
             </a:r>
-            <a:endParaRPr lang="fr-FR"/>
           </a:p>
         </p:txBody>
       </p:sp>
@@ -1429,7 +1421,7 @@
           <a:p>
             <a:pPr lvl="0"/>
             <a:r>
-              <a:rPr lang="fr-FR" smtClean="0"/>
+              <a:rPr lang="fr-FR"/>
               <a:t>Cliquez pour modifier les styles du texte du masque</a:t>
             </a:r>
           </a:p>
@@ -1457,38 +1449,37 @@
           <a:p>
             <a:pPr lvl="0"/>
             <a:r>
-              <a:rPr lang="fr-FR" smtClean="0"/>
+              <a:rPr lang="fr-FR"/>
               <a:t>Cliquez pour modifier les styles du texte du masque</a:t>
             </a:r>
           </a:p>
           <a:p>
             <a:pPr lvl="1"/>
             <a:r>
-              <a:rPr lang="fr-FR" smtClean="0"/>
+              <a:rPr lang="fr-FR"/>
               <a:t>Deuxième niveau</a:t>
             </a:r>
           </a:p>
           <a:p>
             <a:pPr lvl="2"/>
             <a:r>
-              <a:rPr lang="fr-FR" smtClean="0"/>
+              <a:rPr lang="fr-FR"/>
               <a:t>Troisième niveau</a:t>
             </a:r>
           </a:p>
           <a:p>
             <a:pPr lvl="3"/>
             <a:r>
-              <a:rPr lang="fr-FR" smtClean="0"/>
+              <a:rPr lang="fr-FR"/>
               <a:t>Quatrième niveau</a:t>
             </a:r>
           </a:p>
           <a:p>
             <a:pPr lvl="4"/>
             <a:r>
-              <a:rPr lang="fr-FR" smtClean="0"/>
+              <a:rPr lang="fr-FR"/>
               <a:t>Cinquième niveau</a:t>
             </a:r>
-            <a:endParaRPr lang="fr-FR"/>
           </a:p>
         </p:txBody>
       </p:sp>
@@ -1551,7 +1542,7 @@
           <a:p>
             <a:pPr lvl="0"/>
             <a:r>
-              <a:rPr lang="fr-FR" smtClean="0"/>
+              <a:rPr lang="fr-FR"/>
               <a:t>Cliquez pour modifier les styles du texte du masque</a:t>
             </a:r>
           </a:p>
@@ -1579,38 +1570,37 @@
           <a:p>
             <a:pPr lvl="0"/>
             <a:r>
-              <a:rPr lang="fr-FR" smtClean="0"/>
+              <a:rPr lang="fr-FR"/>
               <a:t>Cliquez pour modifier les styles du texte du masque</a:t>
             </a:r>
           </a:p>
           <a:p>
             <a:pPr lvl="1"/>
             <a:r>
-              <a:rPr lang="fr-FR" smtClean="0"/>
+              <a:rPr lang="fr-FR"/>
               <a:t>Deuxième niveau</a:t>
             </a:r>
           </a:p>
           <a:p>
             <a:pPr lvl="2"/>
             <a:r>
-              <a:rPr lang="fr-FR" smtClean="0"/>
+              <a:rPr lang="fr-FR"/>
               <a:t>Troisième niveau</a:t>
             </a:r>
           </a:p>
           <a:p>
             <a:pPr lvl="3"/>
             <a:r>
-              <a:rPr lang="fr-FR" smtClean="0"/>
+              <a:rPr lang="fr-FR"/>
               <a:t>Quatrième niveau</a:t>
             </a:r>
           </a:p>
           <a:p>
             <a:pPr lvl="4"/>
             <a:r>
-              <a:rPr lang="fr-FR" smtClean="0"/>
+              <a:rPr lang="fr-FR"/>
               <a:t>Cinquième niveau</a:t>
             </a:r>
-            <a:endParaRPr lang="fr-FR"/>
           </a:p>
         </p:txBody>
       </p:sp>
@@ -1631,7 +1621,7 @@
           <a:p>
             <a:fld id="{9796027F-7875-4030-9381-8BD8C4F21935}" type="datetimeFigureOut">
               <a:rPr lang="en-US" smtClean="0"/>
-              <a:t>5/12/18</a:t>
+              <a:t>5/13/2018</a:t>
             </a:fld>
             <a:endParaRPr lang="en-US" dirty="0"/>
           </a:p>
@@ -1673,7 +1663,7 @@
           <a:p>
             <a:fld id="{D57F1E4F-1CFF-5643-939E-02111984F565}" type="slidenum">
               <a:rPr lang="en-US" smtClean="0"/>
-              <a:t>‹#›</a:t>
+              <a:t>‹N°›</a:t>
             </a:fld>
             <a:endParaRPr lang="en-US" dirty="0"/>
           </a:p>
@@ -1725,10 +1715,9 @@
           <a:lstStyle/>
           <a:p>
             <a:r>
-              <a:rPr lang="fr-FR" smtClean="0"/>
+              <a:rPr lang="fr-FR"/>
               <a:t>Cliquez et modifiez le titre</a:t>
             </a:r>
-            <a:endParaRPr lang="fr-FR"/>
           </a:p>
         </p:txBody>
       </p:sp>
@@ -1749,7 +1738,7 @@
           <a:p>
             <a:fld id="{4509A250-FF31-4206-8172-F9D3106AACB1}" type="datetimeFigureOut">
               <a:rPr lang="en-US" smtClean="0"/>
-              <a:t>5/12/18</a:t>
+              <a:t>5/13/2018</a:t>
             </a:fld>
             <a:endParaRPr lang="en-US" dirty="0"/>
           </a:p>
@@ -1791,7 +1780,7 @@
           <a:p>
             <a:fld id="{D57F1E4F-1CFF-5643-939E-02111984F565}" type="slidenum">
               <a:rPr lang="en-US" smtClean="0"/>
-              <a:t>‹#›</a:t>
+              <a:t>‹N°›</a:t>
             </a:fld>
             <a:endParaRPr lang="en-US" dirty="0"/>
           </a:p>
@@ -1844,7 +1833,7 @@
           <a:p>
             <a:fld id="{4509A250-FF31-4206-8172-F9D3106AACB1}" type="datetimeFigureOut">
               <a:rPr lang="en-US" smtClean="0"/>
-              <a:t>5/12/18</a:t>
+              <a:t>5/13/2018</a:t>
             </a:fld>
             <a:endParaRPr lang="en-US" dirty="0"/>
           </a:p>
@@ -1886,7 +1875,7 @@
           <a:p>
             <a:fld id="{D57F1E4F-1CFF-5643-939E-02111984F565}" type="slidenum">
               <a:rPr lang="en-US" smtClean="0"/>
-              <a:t>‹#›</a:t>
+              <a:t>‹N°›</a:t>
             </a:fld>
             <a:endParaRPr lang="en-US" dirty="0"/>
           </a:p>
@@ -1947,10 +1936,9 @@
           </a:lstStyle>
           <a:p>
             <a:r>
-              <a:rPr lang="fr-FR" smtClean="0"/>
+              <a:rPr lang="fr-FR"/>
               <a:t>Cliquez et modifiez le titre</a:t>
             </a:r>
-            <a:endParaRPr lang="fr-FR"/>
           </a:p>
         </p:txBody>
       </p:sp>
@@ -2004,38 +1992,37 @@
           <a:p>
             <a:pPr lvl="0"/>
             <a:r>
-              <a:rPr lang="fr-FR" smtClean="0"/>
+              <a:rPr lang="fr-FR"/>
               <a:t>Cliquez pour modifier les styles du texte du masque</a:t>
             </a:r>
           </a:p>
           <a:p>
             <a:pPr lvl="1"/>
             <a:r>
-              <a:rPr lang="fr-FR" smtClean="0"/>
+              <a:rPr lang="fr-FR"/>
               <a:t>Deuxième niveau</a:t>
             </a:r>
           </a:p>
           <a:p>
             <a:pPr lvl="2"/>
             <a:r>
-              <a:rPr lang="fr-FR" smtClean="0"/>
+              <a:rPr lang="fr-FR"/>
               <a:t>Troisième niveau</a:t>
             </a:r>
           </a:p>
           <a:p>
             <a:pPr lvl="3"/>
             <a:r>
-              <a:rPr lang="fr-FR" smtClean="0"/>
+              <a:rPr lang="fr-FR"/>
               <a:t>Quatrième niveau</a:t>
             </a:r>
           </a:p>
           <a:p>
             <a:pPr lvl="4"/>
             <a:r>
-              <a:rPr lang="fr-FR" smtClean="0"/>
+              <a:rPr lang="fr-FR"/>
               <a:t>Cinquième niveau</a:t>
             </a:r>
-            <a:endParaRPr lang="fr-FR"/>
           </a:p>
         </p:txBody>
       </p:sp>
@@ -2098,7 +2085,7 @@
           <a:p>
             <a:pPr lvl="0"/>
             <a:r>
-              <a:rPr lang="fr-FR" smtClean="0"/>
+              <a:rPr lang="fr-FR"/>
               <a:t>Cliquez pour modifier les styles du texte du masque</a:t>
             </a:r>
           </a:p>
@@ -2121,7 +2108,7 @@
           <a:p>
             <a:fld id="{4509A250-FF31-4206-8172-F9D3106AACB1}" type="datetimeFigureOut">
               <a:rPr lang="en-US" smtClean="0"/>
-              <a:t>5/12/18</a:t>
+              <a:t>5/13/2018</a:t>
             </a:fld>
             <a:endParaRPr lang="en-US" dirty="0"/>
           </a:p>
@@ -2163,7 +2150,7 @@
           <a:p>
             <a:fld id="{D57F1E4F-1CFF-5643-939E-02111984F565}" type="slidenum">
               <a:rPr lang="en-US" smtClean="0"/>
-              <a:t>‹#›</a:t>
+              <a:t>‹N°›</a:t>
             </a:fld>
             <a:endParaRPr lang="en-US" dirty="0"/>
           </a:p>
@@ -2224,10 +2211,9 @@
           </a:lstStyle>
           <a:p>
             <a:r>
-              <a:rPr lang="fr-FR" smtClean="0"/>
+              <a:rPr lang="fr-FR"/>
               <a:t>Cliquez et modifiez le titre</a:t>
             </a:r>
-            <a:endParaRPr lang="fr-FR"/>
           </a:p>
         </p:txBody>
       </p:sp>
@@ -2351,7 +2337,7 @@
           <a:p>
             <a:pPr lvl="0"/>
             <a:r>
-              <a:rPr lang="fr-FR" smtClean="0"/>
+              <a:rPr lang="fr-FR"/>
               <a:t>Cliquez pour modifier les styles du texte du masque</a:t>
             </a:r>
           </a:p>
@@ -2374,7 +2360,7 @@
           <a:p>
             <a:fld id="{4509A250-FF31-4206-8172-F9D3106AACB1}" type="datetimeFigureOut">
               <a:rPr lang="en-US" smtClean="0"/>
-              <a:t>5/12/18</a:t>
+              <a:t>5/13/2018</a:t>
             </a:fld>
             <a:endParaRPr lang="en-US" dirty="0"/>
           </a:p>
@@ -2416,7 +2402,7 @@
           <a:p>
             <a:fld id="{D57F1E4F-1CFF-5643-939E-02111984F565}" type="slidenum">
               <a:rPr lang="en-US" smtClean="0"/>
-              <a:t>‹#›</a:t>
+              <a:t>‹N°›</a:t>
             </a:fld>
             <a:endParaRPr lang="en-US" dirty="0"/>
           </a:p>
@@ -2483,10 +2469,9 @@
           <a:lstStyle/>
           <a:p>
             <a:r>
-              <a:rPr lang="fr-FR" smtClean="0"/>
+              <a:rPr lang="fr-FR"/>
               <a:t>Cliquez et modifiez le titre</a:t>
             </a:r>
-            <a:endParaRPr lang="fr-FR"/>
           </a:p>
         </p:txBody>
       </p:sp>
@@ -2517,38 +2502,37 @@
           <a:p>
             <a:pPr lvl="0"/>
             <a:r>
-              <a:rPr lang="fr-FR" smtClean="0"/>
+              <a:rPr lang="fr-FR"/>
               <a:t>Cliquez pour modifier les styles du texte du masque</a:t>
             </a:r>
           </a:p>
           <a:p>
             <a:pPr lvl="1"/>
             <a:r>
-              <a:rPr lang="fr-FR" smtClean="0"/>
+              <a:rPr lang="fr-FR"/>
               <a:t>Deuxième niveau</a:t>
             </a:r>
           </a:p>
           <a:p>
             <a:pPr lvl="2"/>
             <a:r>
-              <a:rPr lang="fr-FR" smtClean="0"/>
+              <a:rPr lang="fr-FR"/>
               <a:t>Troisième niveau</a:t>
             </a:r>
           </a:p>
           <a:p>
             <a:pPr lvl="3"/>
             <a:r>
-              <a:rPr lang="fr-FR" smtClean="0"/>
+              <a:rPr lang="fr-FR"/>
               <a:t>Quatrième niveau</a:t>
             </a:r>
           </a:p>
           <a:p>
             <a:pPr lvl="4"/>
             <a:r>
-              <a:rPr lang="fr-FR" smtClean="0"/>
+              <a:rPr lang="fr-FR"/>
               <a:t>Cinquième niveau</a:t>
             </a:r>
-            <a:endParaRPr lang="fr-FR"/>
           </a:p>
         </p:txBody>
       </p:sp>
@@ -2587,7 +2571,7 @@
           <a:p>
             <a:fld id="{4AAD347D-5ACD-4C99-B74B-A9C85AD731AF}" type="datetimeFigureOut">
               <a:rPr lang="en-US" smtClean="0"/>
-              <a:t>5/12/18</a:t>
+              <a:t>5/13/2018</a:t>
             </a:fld>
             <a:endParaRPr lang="en-US" dirty="0"/>
           </a:p>
@@ -2665,7 +2649,7 @@
           <a:p>
             <a:fld id="{D57F1E4F-1CFF-5643-939E-02111984F565}" type="slidenum">
               <a:rPr lang="en-US" smtClean="0"/>
-              <a:t>‹#›</a:t>
+              <a:t>‹N°›</a:t>
             </a:fld>
             <a:endParaRPr lang="en-US" dirty="0"/>
           </a:p>
@@ -3090,7 +3074,7 @@
           <a:p>
             <a:pPr algn="ctr"/>
             <a:r>
-              <a:rPr lang="fr-FR" sz="15000" dirty="0" smtClean="0">
+              <a:rPr lang="fr-FR" sz="15000" dirty="0">
                 <a:solidFill>
                   <a:schemeClr val="bg1"/>
                 </a:solidFill>
@@ -3107,21 +3091,6 @@
               </a:rPr>
               <a:t>P o r ta k</a:t>
             </a:r>
-            <a:endParaRPr lang="fr-FR" sz="15000" dirty="0">
-              <a:solidFill>
-                <a:schemeClr val="bg1"/>
-              </a:solidFill>
-              <a:effectLst>
-                <a:outerShdw blurRad="50800" dist="76200" dir="2700000" algn="tl" rotWithShape="0">
-                  <a:prstClr val="black">
-                    <a:alpha val="40000"/>
-                  </a:prstClr>
-                </a:outerShdw>
-              </a:effectLst>
-              <a:latin typeface="ArcadeClassic" charset="0"/>
-              <a:ea typeface="ArcadeClassic" charset="0"/>
-              <a:cs typeface="ArcadeClassic" charset="0"/>
-            </a:endParaRPr>
           </a:p>
         </p:txBody>
       </p:sp>
@@ -3149,7 +3118,7 @@
           <a:p>
             <a:pPr algn="ctr"/>
             <a:r>
-              <a:rPr lang="fr-FR" sz="3200" dirty="0" smtClean="0">
+              <a:rPr lang="fr-FR" sz="3200" dirty="0">
                 <a:solidFill>
                   <a:srgbClr val="E8EAEC"/>
                 </a:solidFill>
@@ -3164,28 +3133,10 @@
                 <a:ea typeface="ArcadeClassic" charset="0"/>
                 <a:cs typeface="ArcadeClassic" charset="0"/>
               </a:rPr>
-              <a:t>  </a:t>
-            </a:r>
-            <a:r>
-              <a:rPr lang="fr-FR" sz="3200" dirty="0" smtClean="0">
-                <a:solidFill>
-                  <a:srgbClr val="E8EAEC"/>
-                </a:solidFill>
-                <a:effectLst>
-                  <a:outerShdw blurRad="50800" dist="76200" dir="2700000" algn="tl" rotWithShape="0">
-                    <a:prstClr val="black">
-                      <a:alpha val="40000"/>
-                    </a:prstClr>
-                  </a:outerShdw>
-                </a:effectLst>
-                <a:latin typeface="ArcadeClassic" charset="0"/>
-                <a:ea typeface="ArcadeClassic" charset="0"/>
-                <a:cs typeface="ArcadeClassic" charset="0"/>
-              </a:rPr>
-              <a:t>F O R N A </a:t>
-            </a:r>
-            <a:r>
-              <a:rPr lang="fr-FR" sz="3200" spc="-300" dirty="0" smtClean="0">
+              <a:t>  F O R N A </a:t>
+            </a:r>
+            <a:r>
+              <a:rPr lang="fr-FR" sz="3200" spc="-300" dirty="0">
                 <a:solidFill>
                   <a:srgbClr val="E8EAEC"/>
                 </a:solidFill>
@@ -3203,42 +3154,6 @@
               <a:t>LI</a:t>
             </a:r>
             <a:r>
-              <a:rPr lang="fr-FR" sz="3200" dirty="0" smtClean="0">
-                <a:solidFill>
-                  <a:srgbClr val="E8EAEC"/>
-                </a:solidFill>
-                <a:effectLst>
-                  <a:outerShdw blurRad="50800" dist="76200" dir="2700000" algn="tl" rotWithShape="0">
-                    <a:prstClr val="black">
-                      <a:alpha val="40000"/>
-                    </a:prstClr>
-                  </a:outerShdw>
-                </a:effectLst>
-                <a:latin typeface="ArcadeClassic" charset="0"/>
-                <a:ea typeface="ArcadeClassic" charset="0"/>
-                <a:cs typeface="ArcadeClassic" charset="0"/>
-              </a:rPr>
-              <a:t>   D a m i e </a:t>
-            </a:r>
-            <a:r>
-              <a:rPr lang="fr-FR" sz="3200" dirty="0" smtClean="0">
-                <a:solidFill>
-                  <a:srgbClr val="E8EAEC"/>
-                </a:solidFill>
-                <a:effectLst>
-                  <a:outerShdw blurRad="50800" dist="76200" dir="2700000" algn="tl" rotWithShape="0">
-                    <a:prstClr val="black">
-                      <a:alpha val="40000"/>
-                    </a:prstClr>
-                  </a:outerShdw>
-                </a:effectLst>
-                <a:latin typeface="ArcadeClassic" charset="0"/>
-                <a:ea typeface="ArcadeClassic" charset="0"/>
-                <a:cs typeface="ArcadeClassic" charset="0"/>
-              </a:rPr>
-              <a:t>n  -  </a:t>
-            </a:r>
-            <a:r>
               <a:rPr lang="fr-FR" sz="3200" dirty="0">
                 <a:solidFill>
                   <a:srgbClr val="E8EAEC"/>
@@ -3254,23 +3169,8 @@
                 <a:ea typeface="ArcadeClassic" charset="0"/>
                 <a:cs typeface="ArcadeClassic" charset="0"/>
               </a:rPr>
-              <a:t>B E N Z A  A m a n d i n e </a:t>
-            </a:r>
-            <a:endParaRPr lang="fr-FR" sz="3200" dirty="0">
-              <a:solidFill>
-                <a:srgbClr val="E8EAEC"/>
-              </a:solidFill>
-              <a:effectLst>
-                <a:outerShdw blurRad="50800" dist="76200" dir="2700000" algn="tl" rotWithShape="0">
-                  <a:prstClr val="black">
-                    <a:alpha val="40000"/>
-                  </a:prstClr>
-                </a:outerShdw>
-              </a:effectLst>
-              <a:latin typeface="ArcadeClassic" charset="0"/>
-              <a:ea typeface="ArcadeClassic" charset="0"/>
-              <a:cs typeface="ArcadeClassic" charset="0"/>
-            </a:endParaRPr>
+              <a:t>   D a m i e n -  B E N Z A  A m a n d i n e </a:t>
+            </a:r>
           </a:p>
         </p:txBody>
       </p:sp>
@@ -3310,18 +3210,11 @@
   <p:clrMapOvr>
     <a:masterClrMapping/>
   </p:clrMapOvr>
-  <p:timing>
-    <p:tnLst>
-      <p:par>
-        <p:cTn id="1" dur="indefinite" restart="never" nodeType="tmRoot"/>
-      </p:par>
-    </p:tnLst>
-  </p:timing>
 </p:sld>
 </file>
 
-<file path=ppt/slides/slide2.xml><?xml version="1.0" encoding="utf-8"?>
-<p:sld xmlns:a="http://schemas.openxmlformats.org/drawingml/2006/main" xmlns:r="http://schemas.openxmlformats.org/officeDocument/2006/relationships" xmlns:p="http://schemas.openxmlformats.org/presentationml/2006/main">
+<file path=ppt/slides/slide10.xml><?xml version="1.0" encoding="utf-8"?>
+<p:sld xmlns:a="http://schemas.openxmlformats.org/drawingml/2006/main" xmlns:r="http://schemas.openxmlformats.org/officeDocument/2006/relationships" xmlns:p="http://schemas.openxmlformats.org/presentationml/2006/main" show="0">
   <p:cSld>
     <p:spTree>
       <p:nvGrpSpPr>
@@ -3413,24 +3306,69 @@
         </p:nvSpPr>
         <p:spPr>
           <a:xfrm>
-            <a:off x="3922327" y="1030288"/>
-            <a:ext cx="3712876" cy="646331"/>
+            <a:off x="0" y="-770568"/>
+            <a:ext cx="12286268" cy="8203603"/>
+          </a:xfrm>
+          <a:prstGeom prst="rect">
+            <a:avLst/>
+          </a:prstGeom>
+          <a:solidFill>
+            <a:srgbClr val="FDFFEE">
+              <a:alpha val="14902"/>
+            </a:srgbClr>
+          </a:solidFill>
+        </p:spPr>
+        <p:style>
+          <a:lnRef idx="2">
+            <a:schemeClr val="accent1">
+              <a:shade val="50000"/>
+            </a:schemeClr>
+          </a:lnRef>
+          <a:fillRef idx="1">
+            <a:schemeClr val="accent1"/>
+          </a:fillRef>
+          <a:effectRef idx="0">
+            <a:schemeClr val="accent1"/>
+          </a:effectRef>
+          <a:fontRef idx="minor">
+            <a:schemeClr val="lt1"/>
+          </a:fontRef>
+        </p:style>
+        <p:txBody>
+          <a:bodyPr rtlCol="0" anchor="ctr"/>
+          <a:lstStyle/>
+          <a:p>
+            <a:pPr algn="ctr"/>
+            <a:endParaRPr lang="fr-FR"/>
+          </a:p>
+        </p:txBody>
+      </p:sp>
+      <p:sp>
+        <p:nvSpPr>
+          <p:cNvPr id="8" name="Rectangle 7"/>
+          <p:cNvSpPr/>
+          <p:nvPr/>
+        </p:nvSpPr>
+        <p:spPr>
+          <a:xfrm>
+            <a:off x="0" y="516790"/>
+            <a:ext cx="12286268" cy="2400657"/>
           </a:xfrm>
           <a:prstGeom prst="rect">
             <a:avLst/>
           </a:prstGeom>
         </p:spPr>
         <p:txBody>
-          <a:bodyPr wrap="none">
+          <a:bodyPr wrap="square">
             <a:spAutoFit/>
           </a:bodyPr>
           <a:lstStyle/>
           <a:p>
             <a:pPr algn="ctr"/>
             <a:r>
-              <a:rPr lang="fr-FR" sz="3600" dirty="0" smtClean="0">
+              <a:rPr lang="fr-FR" sz="15000" dirty="0">
                 <a:solidFill>
-                  <a:srgbClr val="E8EAEC"/>
+                  <a:schemeClr val="bg1"/>
                 </a:solidFill>
                 <a:effectLst>
                   <a:outerShdw blurRad="50800" dist="76200" dir="2700000" algn="tl" rotWithShape="0">
@@ -3443,65 +3381,25 @@
                 <a:ea typeface="ArcadeClassic" charset="0"/>
                 <a:cs typeface="ArcadeClassic" charset="0"/>
               </a:rPr>
-              <a:t>I.  </a:t>
-            </a:r>
-            <a:r>
-              <a:rPr lang="fr-FR" sz="3600" dirty="0" err="1" smtClean="0">
-                <a:solidFill>
-                  <a:srgbClr val="E8EAEC"/>
-                </a:solidFill>
-                <a:effectLst>
-                  <a:outerShdw blurRad="50800" dist="76200" dir="2700000" algn="tl" rotWithShape="0">
-                    <a:prstClr val="black">
-                      <a:alpha val="40000"/>
-                    </a:prstClr>
-                  </a:outerShdw>
-                </a:effectLst>
-                <a:latin typeface="ArcadeClassic" charset="0"/>
-                <a:ea typeface="ArcadeClassic" charset="0"/>
-                <a:cs typeface="ArcadeClassic" charset="0"/>
-              </a:rPr>
-              <a:t>Presentation</a:t>
-            </a:r>
-            <a:endParaRPr lang="fr-FR" sz="3600" dirty="0">
-              <a:solidFill>
-                <a:srgbClr val="E8EAEC"/>
-              </a:solidFill>
-              <a:effectLst>
-                <a:outerShdw blurRad="50800" dist="76200" dir="2700000" algn="tl" rotWithShape="0">
-                  <a:prstClr val="black">
-                    <a:alpha val="40000"/>
-                  </a:prstClr>
-                </a:outerShdw>
-              </a:effectLst>
-              <a:latin typeface="ArcadeClassic" charset="0"/>
-              <a:ea typeface="ArcadeClassic" charset="0"/>
-              <a:cs typeface="ArcadeClassic" charset="0"/>
-            </a:endParaRPr>
+              <a:t>P o r ta k</a:t>
+            </a:r>
           </a:p>
         </p:txBody>
       </p:sp>
     </p:spTree>
     <p:extLst>
       <p:ext uri="{BB962C8B-B14F-4D97-AF65-F5344CB8AC3E}">
-        <p14:creationId xmlns:p14="http://schemas.microsoft.com/office/powerpoint/2010/main" val="723548482"/>
+        <p14:creationId xmlns:p14="http://schemas.microsoft.com/office/powerpoint/2010/main" val="2022397663"/>
       </p:ext>
     </p:extLst>
   </p:cSld>
   <p:clrMapOvr>
     <a:masterClrMapping/>
   </p:clrMapOvr>
-  <p:timing>
-    <p:tnLst>
-      <p:par>
-        <p:cTn id="1" dur="indefinite" restart="never" nodeType="tmRoot"/>
-      </p:par>
-    </p:tnLst>
-  </p:timing>
 </p:sld>
 </file>
 
-<file path=ppt/slides/slide3.xml><?xml version="1.0" encoding="utf-8"?>
+<file path=ppt/slides/slide2.xml><?xml version="1.0" encoding="utf-8"?>
 <p:sld xmlns:a="http://schemas.openxmlformats.org/drawingml/2006/main" xmlns:r="http://schemas.openxmlformats.org/officeDocument/2006/relationships" xmlns:p="http://schemas.openxmlformats.org/presentationml/2006/main">
   <p:cSld>
     <p:spTree>
@@ -3533,7 +3431,7 @@
           <a:bodyPr/>
           <a:lstStyle/>
           <a:p>
-            <a:endParaRPr lang="fr-FR" dirty="0"/>
+            <a:endParaRPr lang="fr-FR"/>
           </a:p>
         </p:txBody>
       </p:sp>
@@ -3588,14 +3486,14 @@
       </p:pic>
       <p:sp>
         <p:nvSpPr>
-          <p:cNvPr id="6" name="Rectangle 5"/>
+          <p:cNvPr id="5" name="Rectangle 4"/>
           <p:cNvSpPr/>
           <p:nvPr/>
         </p:nvSpPr>
         <p:spPr>
           <a:xfrm>
-            <a:off x="3542419" y="1030288"/>
-            <a:ext cx="4472699" cy="646331"/>
+            <a:off x="3922327" y="276739"/>
+            <a:ext cx="3712876" cy="646331"/>
           </a:xfrm>
           <a:prstGeom prst="rect">
             <a:avLst/>
@@ -3609,7 +3507,7 @@
           <a:p>
             <a:pPr algn="ctr"/>
             <a:r>
-              <a:rPr lang="fr-FR" sz="3600" dirty="0" smtClean="0">
+              <a:rPr lang="fr-FR" sz="3600" dirty="0">
                 <a:solidFill>
                   <a:srgbClr val="E8EAEC"/>
                 </a:solidFill>
@@ -3624,7 +3522,25 @@
                 <a:ea typeface="ArcadeClassic" charset="0"/>
                 <a:cs typeface="ArcadeClassic" charset="0"/>
               </a:rPr>
-              <a:t>II.  FONCTIONALITES</a:t>
+              <a:t>I.  </a:t>
+            </a:r>
+            <a:r>
+              <a:rPr lang="fr-FR" sz="3600" dirty="0" err="1">
+                <a:solidFill>
+                  <a:srgbClr val="E8EAEC"/>
+                </a:solidFill>
+                <a:effectLst>
+                  <a:outerShdw blurRad="50800" dist="76200" dir="2700000" algn="tl" rotWithShape="0">
+                    <a:prstClr val="black">
+                      <a:alpha val="40000"/>
+                    </a:prstClr>
+                  </a:outerShdw>
+                </a:effectLst>
+                <a:latin typeface="ArcadeClassic" charset="0"/>
+                <a:ea typeface="ArcadeClassic" charset="0"/>
+                <a:cs typeface="ArcadeClassic" charset="0"/>
+              </a:rPr>
+              <a:t>Presentation</a:t>
             </a:r>
             <a:endParaRPr lang="fr-FR" sz="3600" dirty="0">
               <a:solidFill>
@@ -3647,24 +3563,17 @@
     </p:spTree>
     <p:extLst>
       <p:ext uri="{BB962C8B-B14F-4D97-AF65-F5344CB8AC3E}">
-        <p14:creationId xmlns:p14="http://schemas.microsoft.com/office/powerpoint/2010/main" val="1626927660"/>
+        <p14:creationId xmlns:p14="http://schemas.microsoft.com/office/powerpoint/2010/main" val="1145163428"/>
       </p:ext>
     </p:extLst>
   </p:cSld>
   <p:clrMapOvr>
     <a:masterClrMapping/>
   </p:clrMapOvr>
-  <p:timing>
-    <p:tnLst>
-      <p:par>
-        <p:cTn id="1" dur="indefinite" restart="never" nodeType="tmRoot"/>
-      </p:par>
-    </p:tnLst>
-  </p:timing>
 </p:sld>
 </file>
 
-<file path=ppt/slides/slide4.xml><?xml version="1.0" encoding="utf-8"?>
+<file path=ppt/slides/slide3.xml><?xml version="1.0" encoding="utf-8"?>
 <p:sld xmlns:a="http://schemas.openxmlformats.org/drawingml/2006/main" xmlns:r="http://schemas.openxmlformats.org/officeDocument/2006/relationships" xmlns:p="http://schemas.openxmlformats.org/presentationml/2006/main">
   <p:cSld>
     <p:spTree>
@@ -3751,14 +3660,14 @@
       </p:pic>
       <p:sp>
         <p:nvSpPr>
-          <p:cNvPr id="7" name="Rectangle 6"/>
+          <p:cNvPr id="5" name="Rectangle 4"/>
           <p:cNvSpPr/>
           <p:nvPr/>
         </p:nvSpPr>
         <p:spPr>
           <a:xfrm>
-            <a:off x="3766042" y="1030288"/>
-            <a:ext cx="4025461" cy="646331"/>
+            <a:off x="3922327" y="276739"/>
+            <a:ext cx="3712876" cy="646331"/>
           </a:xfrm>
           <a:prstGeom prst="rect">
             <a:avLst/>
@@ -3772,7 +3681,7 @@
           <a:p>
             <a:pPr algn="ctr"/>
             <a:r>
-              <a:rPr lang="fr-FR" sz="3600" dirty="0" smtClean="0">
+              <a:rPr lang="fr-FR" sz="3600" dirty="0">
                 <a:solidFill>
                   <a:srgbClr val="E8EAEC"/>
                 </a:solidFill>
@@ -3787,10 +3696,10 @@
                 <a:ea typeface="ArcadeClassic" charset="0"/>
                 <a:cs typeface="ArcadeClassic" charset="0"/>
               </a:rPr>
-              <a:t>III.  </a:t>
-            </a:r>
-            <a:r>
-              <a:rPr lang="fr-FR" sz="3600" dirty="0" err="1" smtClean="0">
+              <a:t>I.  </a:t>
+            </a:r>
+            <a:r>
+              <a:rPr lang="fr-FR" sz="3600" dirty="0" err="1">
                 <a:solidFill>
                   <a:srgbClr val="E8EAEC"/>
                 </a:solidFill>
@@ -3805,25 +3714,7 @@
                 <a:ea typeface="ArcadeClassic" charset="0"/>
                 <a:cs typeface="ArcadeClassic" charset="0"/>
               </a:rPr>
-              <a:t>Level</a:t>
-            </a:r>
-            <a:r>
-              <a:rPr lang="fr-FR" sz="3600" dirty="0" smtClean="0">
-                <a:solidFill>
-                  <a:srgbClr val="E8EAEC"/>
-                </a:solidFill>
-                <a:effectLst>
-                  <a:outerShdw blurRad="50800" dist="76200" dir="2700000" algn="tl" rotWithShape="0">
-                    <a:prstClr val="black">
-                      <a:alpha val="40000"/>
-                    </a:prstClr>
-                  </a:outerShdw>
-                </a:effectLst>
-                <a:latin typeface="ArcadeClassic" charset="0"/>
-                <a:ea typeface="ArcadeClassic" charset="0"/>
-                <a:cs typeface="ArcadeClassic" charset="0"/>
-              </a:rPr>
-              <a:t> design</a:t>
+              <a:t>Presentation</a:t>
             </a:r>
             <a:endParaRPr lang="fr-FR" sz="3600" dirty="0">
               <a:solidFill>
@@ -3843,27 +3734,78 @@
           </a:p>
         </p:txBody>
       </p:sp>
+      <p:pic>
+        <p:nvPicPr>
+          <p:cNvPr id="1026" name="Picture 2" descr="https://cdn.discordapp.com/attachments/389887163824865302/445284537774243851/unknown.png">
+            <a:extLst>
+              <a:ext uri="{FF2B5EF4-FFF2-40B4-BE49-F238E27FC236}">
+                <a16:creationId xmlns:a16="http://schemas.microsoft.com/office/drawing/2014/main" id="{E92BEDFF-1D38-4D41-9798-240AEF5F0504}"/>
+              </a:ext>
+            </a:extLst>
+          </p:cNvPr>
+          <p:cNvPicPr>
+            <a:picLocks noChangeAspect="1" noChangeArrowheads="1"/>
+          </p:cNvPicPr>
+          <p:nvPr/>
+        </p:nvPicPr>
+        <p:blipFill>
+          <a:blip r:embed="rId3">
+            <a:extLst>
+              <a:ext uri="{28A0092B-C50C-407E-A947-70E740481C1C}">
+                <a14:useLocalDpi xmlns:a14="http://schemas.microsoft.com/office/drawing/2010/main" val="0"/>
+              </a:ext>
+            </a:extLst>
+          </a:blip>
+          <a:srcRect/>
+          <a:stretch>
+            <a:fillRect/>
+          </a:stretch>
+        </p:blipFill>
+        <p:spPr bwMode="auto">
+          <a:xfrm>
+            <a:off x="2338893" y="1268737"/>
+            <a:ext cx="6879744" cy="4574527"/>
+          </a:xfrm>
+          <a:prstGeom prst="rect">
+            <a:avLst/>
+          </a:prstGeom>
+          <a:ln w="19050">
+            <a:solidFill>
+              <a:schemeClr val="tx1"/>
+            </a:solidFill>
+          </a:ln>
+          <a:effectLst>
+            <a:outerShdw blurRad="292100" dist="139700" dir="2700000" algn="tl" rotWithShape="0">
+              <a:srgbClr val="333333">
+                <a:alpha val="65000"/>
+              </a:srgbClr>
+            </a:outerShdw>
+          </a:effectLst>
+          <a:extLst>
+            <a:ext uri="{909E8E84-426E-40DD-AFC4-6F175D3DCCD1}">
+              <a14:hiddenFill xmlns:a14="http://schemas.microsoft.com/office/drawing/2010/main">
+                <a:solidFill>
+                  <a:srgbClr val="FFFFFF"/>
+                </a:solidFill>
+              </a14:hiddenFill>
+            </a:ext>
+          </a:extLst>
+        </p:spPr>
+      </p:pic>
     </p:spTree>
     <p:extLst>
       <p:ext uri="{BB962C8B-B14F-4D97-AF65-F5344CB8AC3E}">
-        <p14:creationId xmlns:p14="http://schemas.microsoft.com/office/powerpoint/2010/main" val="2011388016"/>
+        <p14:creationId xmlns:p14="http://schemas.microsoft.com/office/powerpoint/2010/main" val="723548482"/>
       </p:ext>
     </p:extLst>
   </p:cSld>
   <p:clrMapOvr>
     <a:masterClrMapping/>
   </p:clrMapOvr>
-  <p:timing>
-    <p:tnLst>
-      <p:par>
-        <p:cTn id="1" dur="indefinite" restart="never" nodeType="tmRoot"/>
-      </p:par>
-    </p:tnLst>
-  </p:timing>
 </p:sld>
 </file>
 
-<file path=ppt/slides/slide5.xml><?xml version="1.0" encoding="utf-8"?>
+<file path=ppt/slides/slide4.xml><?xml version="1.0" encoding="utf-8"?>
 <p:sld xmlns:a="http://schemas.openxmlformats.org/drawingml/2006/main" xmlns:r="http://schemas.openxmlformats.org/officeDocument/2006/relationships" xmlns:p="http://schemas.openxmlformats.org/presentationml/2006/main">
   <p:cSld>
     <p:spTree>
@@ -3895,7 +3837,7 @@
           <a:bodyPr/>
           <a:lstStyle/>
           <a:p>
-            <a:endParaRPr lang="fr-FR"/>
+            <a:endParaRPr lang="fr-FR" dirty="0"/>
           </a:p>
         </p:txBody>
       </p:sp>
@@ -3950,6 +3892,324 @@
       </p:pic>
       <p:sp>
         <p:nvSpPr>
+          <p:cNvPr id="6" name="Rectangle 5"/>
+          <p:cNvSpPr/>
+          <p:nvPr/>
+        </p:nvSpPr>
+        <p:spPr>
+          <a:xfrm>
+            <a:off x="3542419" y="1030288"/>
+            <a:ext cx="4472699" cy="646331"/>
+          </a:xfrm>
+          <a:prstGeom prst="rect">
+            <a:avLst/>
+          </a:prstGeom>
+        </p:spPr>
+        <p:txBody>
+          <a:bodyPr wrap="none">
+            <a:spAutoFit/>
+          </a:bodyPr>
+          <a:lstStyle/>
+          <a:p>
+            <a:pPr algn="ctr"/>
+            <a:r>
+              <a:rPr lang="fr-FR" sz="3600" dirty="0">
+                <a:solidFill>
+                  <a:srgbClr val="E8EAEC"/>
+                </a:solidFill>
+                <a:effectLst>
+                  <a:outerShdw blurRad="50800" dist="76200" dir="2700000" algn="tl" rotWithShape="0">
+                    <a:prstClr val="black">
+                      <a:alpha val="40000"/>
+                    </a:prstClr>
+                  </a:outerShdw>
+                </a:effectLst>
+                <a:latin typeface="ArcadeClassic" charset="0"/>
+                <a:ea typeface="ArcadeClassic" charset="0"/>
+                <a:cs typeface="ArcadeClassic" charset="0"/>
+              </a:rPr>
+              <a:t>II.  FONCTIONALITES</a:t>
+            </a:r>
+          </a:p>
+        </p:txBody>
+      </p:sp>
+    </p:spTree>
+    <p:extLst>
+      <p:ext uri="{BB962C8B-B14F-4D97-AF65-F5344CB8AC3E}">
+        <p14:creationId xmlns:p14="http://schemas.microsoft.com/office/powerpoint/2010/main" val="1626927660"/>
+      </p:ext>
+    </p:extLst>
+  </p:cSld>
+  <p:clrMapOvr>
+    <a:masterClrMapping/>
+  </p:clrMapOvr>
+</p:sld>
+</file>
+
+<file path=ppt/slides/slide5.xml><?xml version="1.0" encoding="utf-8"?>
+<p:sld xmlns:a="http://schemas.openxmlformats.org/drawingml/2006/main" xmlns:r="http://schemas.openxmlformats.org/officeDocument/2006/relationships" xmlns:p="http://schemas.openxmlformats.org/presentationml/2006/main">
+  <p:cSld>
+    <p:spTree>
+      <p:nvGrpSpPr>
+        <p:cNvPr id="1" name=""/>
+        <p:cNvGrpSpPr/>
+        <p:nvPr/>
+      </p:nvGrpSpPr>
+      <p:grpSpPr>
+        <a:xfrm>
+          <a:off x="0" y="0"/>
+          <a:ext cx="0" cy="0"/>
+          <a:chOff x="0" y="0"/>
+          <a:chExt cx="0" cy="0"/>
+        </a:xfrm>
+      </p:grpSpPr>
+      <p:sp>
+        <p:nvSpPr>
+          <p:cNvPr id="2" name="Titre 1"/>
+          <p:cNvSpPr>
+            <a:spLocks noGrp="1"/>
+          </p:cNvSpPr>
+          <p:nvPr>
+            <p:ph type="ctrTitle"/>
+          </p:nvPr>
+        </p:nvSpPr>
+        <p:spPr/>
+        <p:txBody>
+          <a:bodyPr/>
+          <a:lstStyle/>
+          <a:p>
+            <a:endParaRPr lang="fr-FR"/>
+          </a:p>
+        </p:txBody>
+      </p:sp>
+      <p:sp>
+        <p:nvSpPr>
+          <p:cNvPr id="3" name="Sous-titre 2"/>
+          <p:cNvSpPr>
+            <a:spLocks noGrp="1"/>
+          </p:cNvSpPr>
+          <p:nvPr>
+            <p:ph type="subTitle" idx="1"/>
+          </p:nvPr>
+        </p:nvSpPr>
+        <p:spPr/>
+        <p:txBody>
+          <a:bodyPr/>
+          <a:lstStyle/>
+          <a:p>
+            <a:endParaRPr lang="fr-FR"/>
+          </a:p>
+        </p:txBody>
+      </p:sp>
+      <p:pic>
+        <p:nvPicPr>
+          <p:cNvPr id="4" name="Image 3"/>
+          <p:cNvPicPr>
+            <a:picLocks noChangeAspect="1"/>
+          </p:cNvPicPr>
+          <p:nvPr/>
+        </p:nvPicPr>
+        <p:blipFill>
+          <a:blip r:embed="rId2">
+            <a:extLst>
+              <a:ext uri="{28A0092B-C50C-407E-A947-70E740481C1C}">
+                <a14:useLocalDpi xmlns:a14="http://schemas.microsoft.com/office/drawing/2010/main" val="0"/>
+              </a:ext>
+            </a:extLst>
+          </a:blip>
+          <a:stretch>
+            <a:fillRect/>
+          </a:stretch>
+        </p:blipFill>
+        <p:spPr>
+          <a:xfrm>
+            <a:off x="0" y="-770568"/>
+            <a:ext cx="12286268" cy="8203604"/>
+          </a:xfrm>
+          <a:prstGeom prst="rect">
+            <a:avLst/>
+          </a:prstGeom>
+        </p:spPr>
+      </p:pic>
+      <p:sp>
+        <p:nvSpPr>
+          <p:cNvPr id="7" name="Rectangle 6"/>
+          <p:cNvSpPr/>
+          <p:nvPr/>
+        </p:nvSpPr>
+        <p:spPr>
+          <a:xfrm>
+            <a:off x="3766042" y="1030288"/>
+            <a:ext cx="4025461" cy="646331"/>
+          </a:xfrm>
+          <a:prstGeom prst="rect">
+            <a:avLst/>
+          </a:prstGeom>
+        </p:spPr>
+        <p:txBody>
+          <a:bodyPr wrap="none">
+            <a:spAutoFit/>
+          </a:bodyPr>
+          <a:lstStyle/>
+          <a:p>
+            <a:pPr algn="ctr"/>
+            <a:r>
+              <a:rPr lang="fr-FR" sz="3600" dirty="0">
+                <a:solidFill>
+                  <a:srgbClr val="E8EAEC"/>
+                </a:solidFill>
+                <a:effectLst>
+                  <a:outerShdw blurRad="50800" dist="76200" dir="2700000" algn="tl" rotWithShape="0">
+                    <a:prstClr val="black">
+                      <a:alpha val="40000"/>
+                    </a:prstClr>
+                  </a:outerShdw>
+                </a:effectLst>
+                <a:latin typeface="ArcadeClassic" charset="0"/>
+                <a:ea typeface="ArcadeClassic" charset="0"/>
+                <a:cs typeface="ArcadeClassic" charset="0"/>
+              </a:rPr>
+              <a:t>III.  </a:t>
+            </a:r>
+            <a:r>
+              <a:rPr lang="fr-FR" sz="3600" dirty="0" err="1">
+                <a:solidFill>
+                  <a:srgbClr val="E8EAEC"/>
+                </a:solidFill>
+                <a:effectLst>
+                  <a:outerShdw blurRad="50800" dist="76200" dir="2700000" algn="tl" rotWithShape="0">
+                    <a:prstClr val="black">
+                      <a:alpha val="40000"/>
+                    </a:prstClr>
+                  </a:outerShdw>
+                </a:effectLst>
+                <a:latin typeface="ArcadeClassic" charset="0"/>
+                <a:ea typeface="ArcadeClassic" charset="0"/>
+                <a:cs typeface="ArcadeClassic" charset="0"/>
+              </a:rPr>
+              <a:t>Level</a:t>
+            </a:r>
+            <a:r>
+              <a:rPr lang="fr-FR" sz="3600" dirty="0">
+                <a:solidFill>
+                  <a:srgbClr val="E8EAEC"/>
+                </a:solidFill>
+                <a:effectLst>
+                  <a:outerShdw blurRad="50800" dist="76200" dir="2700000" algn="tl" rotWithShape="0">
+                    <a:prstClr val="black">
+                      <a:alpha val="40000"/>
+                    </a:prstClr>
+                  </a:outerShdw>
+                </a:effectLst>
+                <a:latin typeface="ArcadeClassic" charset="0"/>
+                <a:ea typeface="ArcadeClassic" charset="0"/>
+                <a:cs typeface="ArcadeClassic" charset="0"/>
+              </a:rPr>
+              <a:t> design</a:t>
+            </a:r>
+          </a:p>
+        </p:txBody>
+      </p:sp>
+    </p:spTree>
+    <p:extLst>
+      <p:ext uri="{BB962C8B-B14F-4D97-AF65-F5344CB8AC3E}">
+        <p14:creationId xmlns:p14="http://schemas.microsoft.com/office/powerpoint/2010/main" val="2011388016"/>
+      </p:ext>
+    </p:extLst>
+  </p:cSld>
+  <p:clrMapOvr>
+    <a:masterClrMapping/>
+  </p:clrMapOvr>
+</p:sld>
+</file>
+
+<file path=ppt/slides/slide6.xml><?xml version="1.0" encoding="utf-8"?>
+<p:sld xmlns:a="http://schemas.openxmlformats.org/drawingml/2006/main" xmlns:r="http://schemas.openxmlformats.org/officeDocument/2006/relationships" xmlns:p="http://schemas.openxmlformats.org/presentationml/2006/main">
+  <p:cSld>
+    <p:spTree>
+      <p:nvGrpSpPr>
+        <p:cNvPr id="1" name=""/>
+        <p:cNvGrpSpPr/>
+        <p:nvPr/>
+      </p:nvGrpSpPr>
+      <p:grpSpPr>
+        <a:xfrm>
+          <a:off x="0" y="0"/>
+          <a:ext cx="0" cy="0"/>
+          <a:chOff x="0" y="0"/>
+          <a:chExt cx="0" cy="0"/>
+        </a:xfrm>
+      </p:grpSpPr>
+      <p:sp>
+        <p:nvSpPr>
+          <p:cNvPr id="2" name="Titre 1"/>
+          <p:cNvSpPr>
+            <a:spLocks noGrp="1"/>
+          </p:cNvSpPr>
+          <p:nvPr>
+            <p:ph type="ctrTitle"/>
+          </p:nvPr>
+        </p:nvSpPr>
+        <p:spPr/>
+        <p:txBody>
+          <a:bodyPr/>
+          <a:lstStyle/>
+          <a:p>
+            <a:endParaRPr lang="fr-FR"/>
+          </a:p>
+        </p:txBody>
+      </p:sp>
+      <p:sp>
+        <p:nvSpPr>
+          <p:cNvPr id="3" name="Sous-titre 2"/>
+          <p:cNvSpPr>
+            <a:spLocks noGrp="1"/>
+          </p:cNvSpPr>
+          <p:nvPr>
+            <p:ph type="subTitle" idx="1"/>
+          </p:nvPr>
+        </p:nvSpPr>
+        <p:spPr/>
+        <p:txBody>
+          <a:bodyPr/>
+          <a:lstStyle/>
+          <a:p>
+            <a:endParaRPr lang="fr-FR"/>
+          </a:p>
+        </p:txBody>
+      </p:sp>
+      <p:pic>
+        <p:nvPicPr>
+          <p:cNvPr id="4" name="Image 3"/>
+          <p:cNvPicPr>
+            <a:picLocks noChangeAspect="1"/>
+          </p:cNvPicPr>
+          <p:nvPr/>
+        </p:nvPicPr>
+        <p:blipFill>
+          <a:blip r:embed="rId2">
+            <a:extLst>
+              <a:ext uri="{28A0092B-C50C-407E-A947-70E740481C1C}">
+                <a14:useLocalDpi xmlns:a14="http://schemas.microsoft.com/office/drawing/2010/main" val="0"/>
+              </a:ext>
+            </a:extLst>
+          </a:blip>
+          <a:stretch>
+            <a:fillRect/>
+          </a:stretch>
+        </p:blipFill>
+        <p:spPr>
+          <a:xfrm>
+            <a:off x="0" y="-770568"/>
+            <a:ext cx="12286268" cy="8203604"/>
+          </a:xfrm>
+          <a:prstGeom prst="rect">
+            <a:avLst/>
+          </a:prstGeom>
+        </p:spPr>
+      </p:pic>
+      <p:sp>
+        <p:nvSpPr>
           <p:cNvPr id="7" name="Rectangle 6"/>
           <p:cNvSpPr/>
           <p:nvPr/>
@@ -3971,7 +4231,7 @@
           <a:p>
             <a:pPr algn="ctr"/>
             <a:r>
-              <a:rPr lang="fr-FR" sz="3600" dirty="0" smtClean="0">
+              <a:rPr lang="fr-FR" sz="3600" dirty="0">
                 <a:solidFill>
                   <a:srgbClr val="E8EAEC"/>
                 </a:solidFill>
@@ -3989,7 +4249,7 @@
               <a:t>IV.  </a:t>
             </a:r>
             <a:r>
-              <a:rPr lang="fr-FR" sz="3600" dirty="0" err="1" smtClean="0">
+              <a:rPr lang="fr-FR" sz="3600" dirty="0" err="1">
                 <a:solidFill>
                   <a:srgbClr val="E8EAEC"/>
                 </a:solidFill>
@@ -4034,17 +4294,10 @@
   <p:clrMapOvr>
     <a:masterClrMapping/>
   </p:clrMapOvr>
-  <p:timing>
-    <p:tnLst>
-      <p:par>
-        <p:cTn id="1" dur="indefinite" restart="never" nodeType="tmRoot"/>
-      </p:par>
-    </p:tnLst>
-  </p:timing>
 </p:sld>
 </file>
 
-<file path=ppt/slides/slide6.xml><?xml version="1.0" encoding="utf-8"?>
+<file path=ppt/slides/slide7.xml><?xml version="1.0" encoding="utf-8"?>
 <p:sld xmlns:a="http://schemas.openxmlformats.org/drawingml/2006/main" xmlns:r="http://schemas.openxmlformats.org/officeDocument/2006/relationships" xmlns:p="http://schemas.openxmlformats.org/presentationml/2006/main">
   <p:cSld>
     <p:spTree>
@@ -4139,17 +4392,10 @@
   <p:clrMapOvr>
     <a:masterClrMapping/>
   </p:clrMapOvr>
-  <p:timing>
-    <p:tnLst>
-      <p:par>
-        <p:cTn id="1" dur="indefinite" restart="never" nodeType="tmRoot"/>
-      </p:par>
-    </p:tnLst>
-  </p:timing>
 </p:sld>
 </file>
 
-<file path=ppt/slides/slide7.xml><?xml version="1.0" encoding="utf-8"?>
+<file path=ppt/slides/slide8.xml><?xml version="1.0" encoding="utf-8"?>
 <p:sld xmlns:a="http://schemas.openxmlformats.org/drawingml/2006/main" xmlns:r="http://schemas.openxmlformats.org/officeDocument/2006/relationships" xmlns:p="http://schemas.openxmlformats.org/presentationml/2006/main">
   <p:cSld>
     <p:spTree>
@@ -4244,17 +4490,10 @@
   <p:clrMapOvr>
     <a:masterClrMapping/>
   </p:clrMapOvr>
-  <p:timing>
-    <p:tnLst>
-      <p:par>
-        <p:cTn id="1" dur="indefinite" restart="never" nodeType="tmRoot"/>
-      </p:par>
-    </p:tnLst>
-  </p:timing>
 </p:sld>
 </file>
 
-<file path=ppt/slides/slide8.xml><?xml version="1.0" encoding="utf-8"?>
+<file path=ppt/slides/slide9.xml><?xml version="1.0" encoding="utf-8"?>
 <p:sld xmlns:a="http://schemas.openxmlformats.org/drawingml/2006/main" xmlns:r="http://schemas.openxmlformats.org/officeDocument/2006/relationships" xmlns:p="http://schemas.openxmlformats.org/presentationml/2006/main">
   <p:cSld>
     <p:spTree>
@@ -4349,214 +4588,6 @@
   <p:clrMapOvr>
     <a:masterClrMapping/>
   </p:clrMapOvr>
-  <p:timing>
-    <p:tnLst>
-      <p:par>
-        <p:cTn id="1" dur="indefinite" restart="never" nodeType="tmRoot"/>
-      </p:par>
-    </p:tnLst>
-  </p:timing>
-</p:sld>
-</file>
-
-<file path=ppt/slides/slide9.xml><?xml version="1.0" encoding="utf-8"?>
-<p:sld xmlns:a="http://schemas.openxmlformats.org/drawingml/2006/main" xmlns:r="http://schemas.openxmlformats.org/officeDocument/2006/relationships" xmlns:p="http://schemas.openxmlformats.org/presentationml/2006/main" show="0">
-  <p:cSld>
-    <p:spTree>
-      <p:nvGrpSpPr>
-        <p:cNvPr id="1" name=""/>
-        <p:cNvGrpSpPr/>
-        <p:nvPr/>
-      </p:nvGrpSpPr>
-      <p:grpSpPr>
-        <a:xfrm>
-          <a:off x="0" y="0"/>
-          <a:ext cx="0" cy="0"/>
-          <a:chOff x="0" y="0"/>
-          <a:chExt cx="0" cy="0"/>
-        </a:xfrm>
-      </p:grpSpPr>
-      <p:sp>
-        <p:nvSpPr>
-          <p:cNvPr id="2" name="Titre 1"/>
-          <p:cNvSpPr>
-            <a:spLocks noGrp="1"/>
-          </p:cNvSpPr>
-          <p:nvPr>
-            <p:ph type="ctrTitle"/>
-          </p:nvPr>
-        </p:nvSpPr>
-        <p:spPr/>
-        <p:txBody>
-          <a:bodyPr/>
-          <a:lstStyle/>
-          <a:p>
-            <a:endParaRPr lang="fr-FR"/>
-          </a:p>
-        </p:txBody>
-      </p:sp>
-      <p:sp>
-        <p:nvSpPr>
-          <p:cNvPr id="3" name="Sous-titre 2"/>
-          <p:cNvSpPr>
-            <a:spLocks noGrp="1"/>
-          </p:cNvSpPr>
-          <p:nvPr>
-            <p:ph type="subTitle" idx="1"/>
-          </p:nvPr>
-        </p:nvSpPr>
-        <p:spPr/>
-        <p:txBody>
-          <a:bodyPr/>
-          <a:lstStyle/>
-          <a:p>
-            <a:endParaRPr lang="fr-FR"/>
-          </a:p>
-        </p:txBody>
-      </p:sp>
-      <p:pic>
-        <p:nvPicPr>
-          <p:cNvPr id="4" name="Image 3"/>
-          <p:cNvPicPr>
-            <a:picLocks noChangeAspect="1"/>
-          </p:cNvPicPr>
-          <p:nvPr/>
-        </p:nvPicPr>
-        <p:blipFill>
-          <a:blip r:embed="rId2">
-            <a:extLst>
-              <a:ext uri="{28A0092B-C50C-407E-A947-70E740481C1C}">
-                <a14:useLocalDpi xmlns:a14="http://schemas.microsoft.com/office/drawing/2010/main" val="0"/>
-              </a:ext>
-            </a:extLst>
-          </a:blip>
-          <a:stretch>
-            <a:fillRect/>
-          </a:stretch>
-        </p:blipFill>
-        <p:spPr>
-          <a:xfrm>
-            <a:off x="0" y="-770568"/>
-            <a:ext cx="12286268" cy="8203604"/>
-          </a:xfrm>
-          <a:prstGeom prst="rect">
-            <a:avLst/>
-          </a:prstGeom>
-        </p:spPr>
-      </p:pic>
-      <p:sp>
-        <p:nvSpPr>
-          <p:cNvPr id="5" name="Rectangle 4"/>
-          <p:cNvSpPr/>
-          <p:nvPr/>
-        </p:nvSpPr>
-        <p:spPr>
-          <a:xfrm>
-            <a:off x="0" y="-770568"/>
-            <a:ext cx="12286268" cy="8203603"/>
-          </a:xfrm>
-          <a:prstGeom prst="rect">
-            <a:avLst/>
-          </a:prstGeom>
-          <a:solidFill>
-            <a:srgbClr val="FDFFEE">
-              <a:alpha val="14902"/>
-            </a:srgbClr>
-          </a:solidFill>
-        </p:spPr>
-        <p:style>
-          <a:lnRef idx="2">
-            <a:schemeClr val="accent1">
-              <a:shade val="50000"/>
-            </a:schemeClr>
-          </a:lnRef>
-          <a:fillRef idx="1">
-            <a:schemeClr val="accent1"/>
-          </a:fillRef>
-          <a:effectRef idx="0">
-            <a:schemeClr val="accent1"/>
-          </a:effectRef>
-          <a:fontRef idx="minor">
-            <a:schemeClr val="lt1"/>
-          </a:fontRef>
-        </p:style>
-        <p:txBody>
-          <a:bodyPr rtlCol="0" anchor="ctr"/>
-          <a:lstStyle/>
-          <a:p>
-            <a:pPr algn="ctr"/>
-            <a:endParaRPr lang="fr-FR"/>
-          </a:p>
-        </p:txBody>
-      </p:sp>
-      <p:sp>
-        <p:nvSpPr>
-          <p:cNvPr id="8" name="Rectangle 7"/>
-          <p:cNvSpPr/>
-          <p:nvPr/>
-        </p:nvSpPr>
-        <p:spPr>
-          <a:xfrm>
-            <a:off x="0" y="516790"/>
-            <a:ext cx="12286268" cy="2400657"/>
-          </a:xfrm>
-          <a:prstGeom prst="rect">
-            <a:avLst/>
-          </a:prstGeom>
-        </p:spPr>
-        <p:txBody>
-          <a:bodyPr wrap="square">
-            <a:spAutoFit/>
-          </a:bodyPr>
-          <a:lstStyle/>
-          <a:p>
-            <a:pPr algn="ctr"/>
-            <a:r>
-              <a:rPr lang="fr-FR" sz="15000" dirty="0">
-                <a:solidFill>
-                  <a:schemeClr val="bg1"/>
-                </a:solidFill>
-                <a:effectLst>
-                  <a:outerShdw blurRad="50800" dist="76200" dir="2700000" algn="tl" rotWithShape="0">
-                    <a:prstClr val="black">
-                      <a:alpha val="40000"/>
-                    </a:prstClr>
-                  </a:outerShdw>
-                </a:effectLst>
-                <a:latin typeface="ArcadeClassic" charset="0"/>
-                <a:ea typeface="ArcadeClassic" charset="0"/>
-                <a:cs typeface="ArcadeClassic" charset="0"/>
-              </a:rPr>
-              <a:t>P o r ta k</a:t>
-            </a:r>
-          </a:p>
-        </p:txBody>
-      </p:sp>
-    </p:spTree>
-    <p:extLst>
-      <p:ext uri="{BB962C8B-B14F-4D97-AF65-F5344CB8AC3E}">
-        <p14:creationId xmlns:p14="http://schemas.microsoft.com/office/powerpoint/2010/main" val="2022397663"/>
-      </p:ext>
-    </p:extLst>
-  </p:cSld>
-  <p:clrMapOvr>
-    <a:masterClrMapping/>
-  </p:clrMapOvr>
-  <mc:AlternateContent xmlns:mc="http://schemas.openxmlformats.org/markup-compatibility/2006">
-    <mc:Choice xmlns:p14="http://schemas.microsoft.com/office/powerpoint/2010/main" Requires="p14">
-      <p:transition spd="slow" p14:dur="2000"/>
-    </mc:Choice>
-    <mc:Fallback>
-      <p:transition spd="slow"/>
-    </mc:Fallback>
-  </mc:AlternateContent>
-  <p:timing>
-    <p:tnLst>
-      <p:par>
-        <p:cTn id="1" dur="indefinite" restart="never" nodeType="tmRoot"/>
-      </p:par>
-    </p:tnLst>
-  </p:timing>
 </p:sld>
 </file>
 

</xml_diff>